<commit_message>
Removing extra files. Changing the main.m
</commit_message>
<xml_diff>
--- a/PPT/Model To predict stock prices!.pptx
+++ b/PPT/Model To predict stock prices!.pptx
@@ -32,21 +32,21 @@
   <p:notesSz cx="6858000" cy="9144000"/>
   <p:embeddedFontLst>
     <p:embeddedFont>
-      <p:font typeface="Oswald" panose="020B0604020202020204" charset="0"/>
+      <p:font typeface="Calibri" panose="020F0502020204030204" pitchFamily="34" charset="0"/>
       <p:regular r:id="rId22"/>
       <p:bold r:id="rId23"/>
+      <p:italic r:id="rId24"/>
+      <p:boldItalic r:id="rId25"/>
+    </p:embeddedFont>
+    <p:embeddedFont>
+      <p:font typeface="Oswald" panose="020B0604020202020204" charset="0"/>
+      <p:regular r:id="rId26"/>
+      <p:bold r:id="rId27"/>
     </p:embeddedFont>
     <p:embeddedFont>
       <p:font typeface="Source Code Pro" panose="020B0604020202020204" charset="0"/>
-      <p:regular r:id="rId24"/>
-      <p:bold r:id="rId25"/>
-    </p:embeddedFont>
-    <p:embeddedFont>
-      <p:font typeface="Calibri" panose="020F0502020204030204" pitchFamily="34" charset="0"/>
-      <p:regular r:id="rId26"/>
-      <p:bold r:id="rId27"/>
-      <p:italic r:id="rId28"/>
-      <p:boldItalic r:id="rId29"/>
+      <p:regular r:id="rId28"/>
+      <p:bold r:id="rId29"/>
     </p:embeddedFont>
   </p:embeddedFontLst>
   <p:defaultTextStyle>
@@ -251,6 +251,11 @@
       </a:defRPr>
     </a:lvl9pPr>
   </p:defaultTextStyle>
+  <p:extLst>
+    <p:ext uri="{EFAFB233-063F-42B5-8137-9DF3F51BA10A}">
+      <p15:sldGuideLst xmlns:p15="http://schemas.microsoft.com/office/powerpoint/2012/main"/>
+    </p:ext>
+  </p:extLst>
 </p:presentation>
 </file>
 
@@ -545,8 +550,8 @@
         </p:nvSpPr>
         <p:spPr>
           <a:xfrm>
-            <a:off x="381300" y="685800"/>
-            <a:ext cx="6096075" cy="3429000"/>
+            <a:off x="381000" y="685800"/>
+            <a:ext cx="6096000" cy="3429000"/>
           </a:xfrm>
           <a:custGeom>
             <a:avLst/>
@@ -6690,33 +6695,10 @@
               <a:buNone/>
             </a:pPr>
             <a:r>
-              <a:rPr lang="en" sz="2400" dirty="0"/>
-              <a:t>Aishwarya</a:t>
-            </a:r>
-          </a:p>
-          <a:p>
-            <a:pPr marL="4572000" lvl="0" indent="457200" algn="l" rtl="0">
-              <a:spcBef>
-                <a:spcPts val="0"/>
-              </a:spcBef>
-              <a:buNone/>
-            </a:pPr>
-            <a:r>
-              <a:rPr lang="en" sz="2400" dirty="0"/>
-              <a:t>Anil</a:t>
-            </a:r>
-          </a:p>
-          <a:p>
-            <a:pPr marL="4572000" lvl="0" indent="457200" algn="l" rtl="0">
-              <a:spcBef>
-                <a:spcPts val="0"/>
-              </a:spcBef>
-              <a:buNone/>
-            </a:pPr>
-            <a:r>
-              <a:rPr lang="en" sz="2400" dirty="0"/>
-              <a:t>Ankita</a:t>
-            </a:r>
+              <a:rPr lang="en" sz="2400" smtClean="0"/>
+              <a:t>Anil Tiwari</a:t>
+            </a:r>
+            <a:endParaRPr lang="en" sz="2400" dirty="0"/>
           </a:p>
           <a:p>
             <a:pPr marL="4114800" lvl="0" indent="0" algn="l" rtl="0">
@@ -11666,15 +11648,7 @@
             </a:pPr>
             <a:r>
               <a:rPr lang="en" dirty="0" smtClean="0"/>
-              <a:t>But, </a:t>
-            </a:r>
-            <a:r>
-              <a:rPr lang="en" dirty="0" smtClean="0"/>
-              <a:t>is </a:t>
-            </a:r>
-            <a:r>
-              <a:rPr lang="en" dirty="0" smtClean="0"/>
-              <a:t>stock </a:t>
+              <a:t>But, is stock </a:t>
             </a:r>
             <a:r>
               <a:rPr lang="en" dirty="0"/>

</xml_diff>